<commit_message>
tdf#90672: PPTX table cell border color is not exported.
Problem Description :
XML Difference :
Original :
<a:solidFill>
  <a:srgbClr val="00B0F0"/>
</a:solidFill>

After Roundtrip : tag is missing

Solution : Added support for table cell border color.

Change-Id: I2baf969d7a8e46a0c5825d9f57bf135ec479c9eb
Reviewed-on: https://gerrit.libreoffice.org/15364
Reviewed-by: Caolán McNamara <caolanm@redhat.com>
Tested-by: Caolán McNamara <caolanm@redhat.com>
</commit_message>
<xml_diff>
--- a/sd/qa/unit/data/pptx/n90190.pptx
+++ b/sd/qa/unit/data/pptx/n90190.pptx
@@ -289,7 +289,7 @@
             <a:fld id="{1D8BD707-D9CF-40AE-B4C6-C98DA3205C09}" type="datetimeFigureOut">
               <a:rPr lang="en-US" smtClean="0"/>
               <a:pPr/>
-              <a:t>4/16/2015</a:t>
+              <a:t>4/17/2015</a:t>
             </a:fld>
             <a:endParaRPr lang="en-US"/>
           </a:p>
@@ -456,7 +456,7 @@
             <a:fld id="{1D8BD707-D9CF-40AE-B4C6-C98DA3205C09}" type="datetimeFigureOut">
               <a:rPr lang="en-US" smtClean="0"/>
               <a:pPr/>
-              <a:t>4/16/2015</a:t>
+              <a:t>4/17/2015</a:t>
             </a:fld>
             <a:endParaRPr lang="en-US"/>
           </a:p>
@@ -633,7 +633,7 @@
             <a:fld id="{1D8BD707-D9CF-40AE-B4C6-C98DA3205C09}" type="datetimeFigureOut">
               <a:rPr lang="en-US" smtClean="0"/>
               <a:pPr/>
-              <a:t>4/16/2015</a:t>
+              <a:t>4/17/2015</a:t>
             </a:fld>
             <a:endParaRPr lang="en-US"/>
           </a:p>
@@ -800,7 +800,7 @@
             <a:fld id="{1D8BD707-D9CF-40AE-B4C6-C98DA3205C09}" type="datetimeFigureOut">
               <a:rPr lang="en-US" smtClean="0"/>
               <a:pPr/>
-              <a:t>4/16/2015</a:t>
+              <a:t>4/17/2015</a:t>
             </a:fld>
             <a:endParaRPr lang="en-US"/>
           </a:p>
@@ -1043,7 +1043,7 @@
             <a:fld id="{1D8BD707-D9CF-40AE-B4C6-C98DA3205C09}" type="datetimeFigureOut">
               <a:rPr lang="en-US" smtClean="0"/>
               <a:pPr/>
-              <a:t>4/16/2015</a:t>
+              <a:t>4/17/2015</a:t>
             </a:fld>
             <a:endParaRPr lang="en-US"/>
           </a:p>
@@ -1328,7 +1328,7 @@
             <a:fld id="{1D8BD707-D9CF-40AE-B4C6-C98DA3205C09}" type="datetimeFigureOut">
               <a:rPr lang="en-US" smtClean="0"/>
               <a:pPr/>
-              <a:t>4/16/2015</a:t>
+              <a:t>4/17/2015</a:t>
             </a:fld>
             <a:endParaRPr lang="en-US"/>
           </a:p>
@@ -1747,7 +1747,7 @@
             <a:fld id="{1D8BD707-D9CF-40AE-B4C6-C98DA3205C09}" type="datetimeFigureOut">
               <a:rPr lang="en-US" smtClean="0"/>
               <a:pPr/>
-              <a:t>4/16/2015</a:t>
+              <a:t>4/17/2015</a:t>
             </a:fld>
             <a:endParaRPr lang="en-US"/>
           </a:p>
@@ -1862,7 +1862,7 @@
             <a:fld id="{1D8BD707-D9CF-40AE-B4C6-C98DA3205C09}" type="datetimeFigureOut">
               <a:rPr lang="en-US" smtClean="0"/>
               <a:pPr/>
-              <a:t>4/16/2015</a:t>
+              <a:t>4/17/2015</a:t>
             </a:fld>
             <a:endParaRPr lang="en-US"/>
           </a:p>
@@ -1954,7 +1954,7 @@
             <a:fld id="{1D8BD707-D9CF-40AE-B4C6-C98DA3205C09}" type="datetimeFigureOut">
               <a:rPr lang="en-US" smtClean="0"/>
               <a:pPr/>
-              <a:t>4/16/2015</a:t>
+              <a:t>4/17/2015</a:t>
             </a:fld>
             <a:endParaRPr lang="en-US"/>
           </a:p>
@@ -2228,7 +2228,7 @@
             <a:fld id="{1D8BD707-D9CF-40AE-B4C6-C98DA3205C09}" type="datetimeFigureOut">
               <a:rPr lang="en-US" smtClean="0"/>
               <a:pPr/>
-              <a:t>4/16/2015</a:t>
+              <a:t>4/17/2015</a:t>
             </a:fld>
             <a:endParaRPr lang="en-US"/>
           </a:p>
@@ -2478,7 +2478,7 @@
             <a:fld id="{1D8BD707-D9CF-40AE-B4C6-C98DA3205C09}" type="datetimeFigureOut">
               <a:rPr lang="en-US" smtClean="0"/>
               <a:pPr/>
-              <a:t>4/16/2015</a:t>
+              <a:t>4/17/2015</a:t>
             </a:fld>
             <a:endParaRPr lang="en-US"/>
           </a:p>
@@ -2688,7 +2688,7 @@
             <a:fld id="{1D8BD707-D9CF-40AE-B4C6-C98DA3205C09}" type="datetimeFigureOut">
               <a:rPr lang="en-US" smtClean="0"/>
               <a:pPr/>
-              <a:t>4/16/2015</a:t>
+              <a:t>4/17/2015</a:t>
             </a:fld>
             <a:endParaRPr lang="en-US"/>
           </a:p>
@@ -3061,30 +3061,31 @@
       </p:grpSpPr>
       <p:graphicFrame>
         <p:nvGraphicFramePr>
-          <p:cNvPr id="2" name="Table 1"/>
+          <p:cNvPr id="4" name="Table 3"/>
           <p:cNvGraphicFramePr>
             <a:graphicFrameLocks noGrp="1"/>
           </p:cNvGraphicFramePr>
           <p:nvPr>
             <p:extLst>
               <p:ext uri="{D42A27DB-BD31-4B8C-83A1-F6EECF244321}">
-                <p14:modId xmlns:p14="http://schemas.microsoft.com/office/powerpoint/2010/main" val="1056956566"/>
+                <p14:modId xmlns:p14="http://schemas.microsoft.com/office/powerpoint/2010/main" val="779815928"/>
               </p:ext>
             </p:extLst>
           </p:nvPr>
         </p:nvGraphicFramePr>
         <p:xfrm>
-          <a:off x="2438400" y="2438400"/>
-          <a:ext cx="1752600" cy="370840"/>
+          <a:off x="2590800" y="2667000"/>
+          <a:ext cx="3276600" cy="370840"/>
         </p:xfrm>
         <a:graphic>
           <a:graphicData uri="http://schemas.openxmlformats.org/drawingml/2006/table">
             <a:tbl>
               <a:tblPr firstRow="1" bandRow="1">
-                <a:tableStyleId>{2D5ABB26-0587-4C30-8999-92F81FD0307C}</a:tableStyleId>
+                <a:tableStyleId>{5C22544A-7EE6-4342-B048-85BDC9FD1C3A}</a:tableStyleId>
               </a:tblPr>
               <a:tblGrid>
                 <a:gridCol w="1752600"/>
+                <a:gridCol w="1524000"/>
               </a:tblGrid>
               <a:tr h="370840">
                 <a:tc>
@@ -3093,8 +3094,8 @@
                     <a:lstStyle/>
                     <a:p>
                       <a:r>
-                        <a:rPr lang="en-US" dirty="0" err="1" smtClean="0"/>
-                        <a:t>LibreOffice</a:t>
+                        <a:rPr lang="en-US" dirty="0" smtClean="0"/>
+                        <a:t>Red</a:t>
                       </a:r>
                       <a:endParaRPr lang="en-IN" dirty="0"/>
                     </a:p>
@@ -3102,16 +3103,52 @@
                   <a:tcPr>
                     <a:lnL w="76200" cap="flat" cmpd="sng" algn="ctr">
                       <a:solidFill>
-                        <a:schemeClr val="accent6"/>
+                        <a:srgbClr val="00B0F0"/>
                       </a:solidFill>
                       <a:prstDash val="solid"/>
                       <a:round/>
                       <a:headEnd type="none" w="med" len="med"/>
                       <a:tailEnd type="none" w="med" len="med"/>
                     </a:lnL>
+                    <a:lnT w="76200" cap="flat" cmpd="sng" algn="ctr">
+                      <a:solidFill>
+                        <a:srgbClr val="00B0F0"/>
+                      </a:solidFill>
+                      <a:prstDash val="solid"/>
+                      <a:round/>
+                      <a:headEnd type="none" w="med" len="med"/>
+                      <a:tailEnd type="none" w="med" len="med"/>
+                    </a:lnT>
+                    <a:lnB w="76200" cap="flat" cmpd="sng" algn="ctr">
+                      <a:solidFill>
+                        <a:srgbClr val="00B0F0"/>
+                      </a:solidFill>
+                      <a:prstDash val="solid"/>
+                      <a:round/>
+                      <a:headEnd type="none" w="med" len="med"/>
+                      <a:tailEnd type="none" w="med" len="med"/>
+                    </a:lnB>
+                    <a:solidFill>
+                      <a:srgbClr val="FF0000"/>
+                    </a:solidFill>
+                  </a:tcPr>
+                </a:tc>
+                <a:tc>
+                  <a:txBody>
+                    <a:bodyPr/>
+                    <a:lstStyle/>
+                    <a:p>
+                      <a:r>
+                        <a:rPr lang="en-US" dirty="0" smtClean="0"/>
+                        <a:t>Green</a:t>
+                      </a:r>
+                      <a:endParaRPr lang="en-IN" dirty="0"/>
+                    </a:p>
+                  </a:txBody>
+                  <a:tcPr>
                     <a:lnR w="76200" cap="flat" cmpd="sng" algn="ctr">
                       <a:solidFill>
-                        <a:schemeClr val="accent6"/>
+                        <a:srgbClr val="00B0F0"/>
                       </a:solidFill>
                       <a:prstDash val="solid"/>
                       <a:round/>
@@ -3120,7 +3157,7 @@
                     </a:lnR>
                     <a:lnT w="76200" cap="flat" cmpd="sng" algn="ctr">
                       <a:solidFill>
-                        <a:schemeClr val="accent6"/>
+                        <a:srgbClr val="00B0F0"/>
                       </a:solidFill>
                       <a:prstDash val="solid"/>
                       <a:round/>
@@ -3129,13 +3166,16 @@
                     </a:lnT>
                     <a:lnB w="76200" cap="flat" cmpd="sng" algn="ctr">
                       <a:solidFill>
-                        <a:schemeClr val="accent6"/>
+                        <a:srgbClr val="00B0F0"/>
                       </a:solidFill>
                       <a:prstDash val="solid"/>
                       <a:round/>
                       <a:headEnd type="none" w="med" len="med"/>
                       <a:tailEnd type="none" w="med" len="med"/>
                     </a:lnB>
+                    <a:solidFill>
+                      <a:srgbClr val="00B050"/>
+                    </a:solidFill>
                   </a:tcPr>
                 </a:tc>
               </a:tr>
@@ -3146,7 +3186,7 @@
     </p:spTree>
     <p:extLst>
       <p:ext uri="{BB962C8B-B14F-4D97-AF65-F5344CB8AC3E}">
-        <p14:creationId xmlns:p14="http://schemas.microsoft.com/office/powerpoint/2010/main" val="3135922569"/>
+        <p14:creationId xmlns:p14="http://schemas.microsoft.com/office/powerpoint/2010/main" val="2363703900"/>
       </p:ext>
     </p:extLst>
   </p:cSld>

</xml_diff>